<commit_message>
section - 8 - review - 2
</commit_message>
<xml_diff>
--- a/learning/流程引擎断网环境下集成测试的实践/分享/流程引擎断网环境下集成测试的实践.pptx
+++ b/learning/流程引擎断网环境下集成测试的实践/分享/流程引擎断网环境下集成测试的实践.pptx
@@ -232,7 +232,7 @@
           <a:p>
             <a:fld id="{700EB4B2-3E24-2640-903D-5CC394B41686}" type="datetimeFigureOut">
               <a:rPr kumimoji="1" lang="zh-CN" altLang="en-US" smtClean="0"/>
-              <a:t>2022/2/21</a:t>
+              <a:t>2022/2/22</a:t>
             </a:fld>
             <a:endParaRPr kumimoji="1" lang="zh-CN" altLang="en-US"/>
           </a:p>
@@ -409,7 +409,7 @@
           <a:p>
             <a:fld id="{A65F9627-3C60-D447-9325-1C07DB8472C3}" type="datetimeFigureOut">
               <a:rPr kumimoji="1" lang="zh-CN" altLang="en-US" smtClean="0"/>
-              <a:t>2022/2/21</a:t>
+              <a:t>2022/2/22</a:t>
             </a:fld>
             <a:endParaRPr kumimoji="1" lang="zh-CN" altLang="en-US"/>
           </a:p>
@@ -1354,7 +1354,7 @@
           <a:p>
             <a:fld id="{7D4DE4AB-7959-4BB6-B551-E3080EF2268D}" type="datetimeFigureOut">
               <a:rPr lang="zh-CN" altLang="en-US" smtClean="0"/>
-              <a:t>2022/2/21</a:t>
+              <a:t>2022/2/22</a:t>
             </a:fld>
             <a:endParaRPr lang="zh-CN" altLang="en-US"/>
           </a:p>

</xml_diff>